<commit_message>
Version Alpha 0.3.4.2: 1. Some fixes.
</commit_message>
<xml_diff>
--- a/Awimul.pptx
+++ b/Awimul.pptx
@@ -202,7 +202,7 @@
           <a:p>
             <a:fld id="{0BF6127D-7F03-47CD-AE8D-641B47194505}" type="datetimeFigureOut">
               <a:rPr lang="ru-RU" smtClean="0"/>
-              <a:t>23.05.2021</a:t>
+              <a:t>27.05.2021</a:t>
             </a:fld>
             <a:endParaRPr lang="ru-RU"/>
           </a:p>
@@ -775,7 +775,7 @@
           <a:p>
             <a:fld id="{1044B096-16CF-481C-8EF8-08CAE0C4BB69}" type="datetimeFigureOut">
               <a:rPr lang="ru-RU" smtClean="0"/>
-              <a:t>23.05.2021</a:t>
+              <a:t>27.05.2021</a:t>
             </a:fld>
             <a:endParaRPr lang="ru-RU"/>
           </a:p>
@@ -1644,7 +1644,7 @@
           <a:p>
             <a:fld id="{1044B096-16CF-481C-8EF8-08CAE0C4BB69}" type="datetimeFigureOut">
               <a:rPr lang="ru-RU" smtClean="0"/>
-              <a:t>23.05.2021</a:t>
+              <a:t>27.05.2021</a:t>
             </a:fld>
             <a:endParaRPr lang="ru-RU"/>
           </a:p>
@@ -1819,7 +1819,7 @@
           <a:p>
             <a:fld id="{1044B096-16CF-481C-8EF8-08CAE0C4BB69}" type="datetimeFigureOut">
               <a:rPr lang="ru-RU" smtClean="0"/>
-              <a:t>23.05.2021</a:t>
+              <a:t>27.05.2021</a:t>
             </a:fld>
             <a:endParaRPr lang="ru-RU"/>
           </a:p>
@@ -1989,7 +1989,7 @@
           <a:p>
             <a:fld id="{1044B096-16CF-481C-8EF8-08CAE0C4BB69}" type="datetimeFigureOut">
               <a:rPr lang="ru-RU" smtClean="0"/>
-              <a:t>23.05.2021</a:t>
+              <a:t>27.05.2021</a:t>
             </a:fld>
             <a:endParaRPr lang="ru-RU"/>
           </a:p>
@@ -2199,7 +2199,7 @@
           <a:p>
             <a:fld id="{1044B096-16CF-481C-8EF8-08CAE0C4BB69}" type="datetimeFigureOut">
               <a:rPr lang="ru-RU" smtClean="0"/>
-              <a:t>23.05.2021</a:t>
+              <a:t>27.05.2021</a:t>
             </a:fld>
             <a:endParaRPr lang="ru-RU"/>
           </a:p>
@@ -3013,7 +3013,7 @@
           <a:p>
             <a:fld id="{1044B096-16CF-481C-8EF8-08CAE0C4BB69}" type="datetimeFigureOut">
               <a:rPr lang="ru-RU" smtClean="0"/>
-              <a:t>23.05.2021</a:t>
+              <a:t>27.05.2021</a:t>
             </a:fld>
             <a:endParaRPr lang="ru-RU"/>
           </a:p>
@@ -3249,7 +3249,7 @@
           <a:p>
             <a:fld id="{1044B096-16CF-481C-8EF8-08CAE0C4BB69}" type="datetimeFigureOut">
               <a:rPr lang="ru-RU" smtClean="0"/>
-              <a:t>23.05.2021</a:t>
+              <a:t>27.05.2021</a:t>
             </a:fld>
             <a:endParaRPr lang="ru-RU"/>
           </a:p>
@@ -3572,7 +3572,7 @@
           <a:p>
             <a:fld id="{1044B096-16CF-481C-8EF8-08CAE0C4BB69}" type="datetimeFigureOut">
               <a:rPr lang="ru-RU" smtClean="0"/>
-              <a:t>23.05.2021</a:t>
+              <a:t>27.05.2021</a:t>
             </a:fld>
             <a:endParaRPr lang="ru-RU"/>
           </a:p>
@@ -3662,7 +3662,7 @@
           <a:p>
             <a:fld id="{1044B096-16CF-481C-8EF8-08CAE0C4BB69}" type="datetimeFigureOut">
               <a:rPr lang="ru-RU" smtClean="0"/>
-              <a:t>23.05.2021</a:t>
+              <a:t>27.05.2021</a:t>
             </a:fld>
             <a:endParaRPr lang="ru-RU"/>
           </a:p>
@@ -4179,7 +4179,7 @@
           <a:p>
             <a:fld id="{1044B096-16CF-481C-8EF8-08CAE0C4BB69}" type="datetimeFigureOut">
               <a:rPr lang="ru-RU" smtClean="0"/>
-              <a:t>23.05.2021</a:t>
+              <a:t>27.05.2021</a:t>
             </a:fld>
             <a:endParaRPr lang="ru-RU"/>
           </a:p>
@@ -4690,7 +4690,7 @@
           <a:p>
             <a:fld id="{1044B096-16CF-481C-8EF8-08CAE0C4BB69}" type="datetimeFigureOut">
               <a:rPr lang="ru-RU" smtClean="0"/>
-              <a:t>23.05.2021</a:t>
+              <a:t>27.05.2021</a:t>
             </a:fld>
             <a:endParaRPr lang="ru-RU"/>
           </a:p>
@@ -4935,7 +4935,7 @@
           <a:p>
             <a:fld id="{1044B096-16CF-481C-8EF8-08CAE0C4BB69}" type="datetimeFigureOut">
               <a:rPr lang="ru-RU" smtClean="0"/>
-              <a:t>23.05.2021</a:t>
+              <a:t>27.05.2021</a:t>
             </a:fld>
             <a:endParaRPr lang="ru-RU"/>
           </a:p>
@@ -6198,11 +6198,7 @@
           <a:p>
             <a:r>
               <a:rPr lang="ru-RU" sz="2800" dirty="0" smtClean="0"/>
-              <a:t>Создать </a:t>
-            </a:r>
-            <a:r>
-              <a:rPr lang="ru-RU" sz="2800" dirty="0" smtClean="0"/>
-              <a:t>меню</a:t>
+              <a:t>Создать меню</a:t>
             </a:r>
             <a:r>
               <a:rPr lang="en-US" sz="2800" dirty="0" smtClean="0"/>
@@ -6210,11 +6206,7 @@
             </a:r>
             <a:r>
               <a:rPr lang="ru-RU" sz="2800" dirty="0" smtClean="0"/>
-              <a:t>для настройки параметров </a:t>
-            </a:r>
-            <a:r>
-              <a:rPr lang="ru-RU" sz="2800" dirty="0" smtClean="0"/>
-              <a:t>системы и пользователей.</a:t>
+              <a:t>для настройки параметров системы и пользователей.</a:t>
             </a:r>
             <a:endParaRPr lang="ru-RU" sz="3600" dirty="0"/>
           </a:p>
@@ -7980,11 +7972,7 @@
             <a:pPr algn="ctr"/>
             <a:r>
               <a:rPr lang="en-US" sz="1200" dirty="0" err="1" smtClean="0"/>
-              <a:t>w</a:t>
-            </a:r>
-            <a:r>
-              <a:rPr lang="en-US" sz="1200" dirty="0" err="1" smtClean="0"/>
-              <a:t>ine_surface_changed</a:t>
+              <a:t>wine_surface_changed</a:t>
             </a:r>
             <a:endParaRPr lang="ru-RU" sz="1200" dirty="0"/>
           </a:p>
@@ -8252,11 +8240,7 @@
             <a:pPr algn="ctr"/>
             <a:r>
               <a:rPr lang="en-US" sz="1200" dirty="0" err="1" smtClean="0"/>
-              <a:t>w</a:t>
-            </a:r>
-            <a:r>
-              <a:rPr lang="en-US" sz="1200" dirty="0" err="1" smtClean="0"/>
-              <a:t>ine_surface_changed</a:t>
+              <a:t>wine_surface_changed</a:t>
             </a:r>
             <a:endParaRPr lang="ru-RU" sz="1200" dirty="0"/>
           </a:p>
@@ -8806,12 +8790,8 @@
           <a:p>
             <a:pPr algn="ctr"/>
             <a:r>
-              <a:rPr lang="en-US" sz="1200" dirty="0" err="1" smtClean="0"/>
-              <a:t>w</a:t>
-            </a:r>
-            <a:r>
-              <a:rPr lang="en-US" sz="1200" dirty="0" err="1" smtClean="0"/>
-              <a:t>ine_surface_changed</a:t>
+              <a:rPr lang="en-US" sz="1200"/>
+              <a:t>wine_motion_event</a:t>
             </a:r>
             <a:endParaRPr lang="ru-RU" sz="1200" dirty="0"/>
           </a:p>
@@ -8855,15 +8835,7 @@
             <a:pPr algn="ctr"/>
             <a:r>
               <a:rPr lang="en-US" sz="1200" dirty="0" err="1" smtClean="0"/>
-              <a:t>w</a:t>
-            </a:r>
-            <a:r>
-              <a:rPr lang="en-US" sz="1200" dirty="0" err="1" smtClean="0"/>
-              <a:t>ine_</a:t>
-            </a:r>
-            <a:r>
-              <a:rPr lang="en-US" sz="1200" dirty="0" err="1" smtClean="0"/>
-              <a:t>motion_event</a:t>
+              <a:t>wine_motion_event</a:t>
             </a:r>
             <a:endParaRPr lang="ru-RU" sz="1200" dirty="0"/>
           </a:p>

</xml_diff>